<commit_message>
Created README.md Changed Ppt inserted images Updated Simulation.ipynb
</commit_message>
<xml_diff>
--- a/BlackJackV2.pptx
+++ b/BlackJackV2.pptx
@@ -6650,7 +6650,7 @@
         <a:lstStyle/>
         <a:p>
           <a:r>
-            <a:rPr lang="en-US"/>
+            <a:rPr lang="en-US" dirty="0"/>
             <a:t>Player Decision to Stand</a:t>
           </a:r>
         </a:p>
@@ -6686,7 +6686,7 @@
         <a:lstStyle/>
         <a:p>
           <a:r>
-            <a:rPr lang="en-US"/>
+            <a:rPr lang="en-US" dirty="0"/>
             <a:t>Dealer Decision to Stand</a:t>
           </a:r>
         </a:p>
@@ -6722,7 +6722,7 @@
         <a:lstStyle/>
         <a:p>
           <a:r>
-            <a:rPr lang="en-US"/>
+            <a:rPr lang="en-US" dirty="0"/>
             <a:t>No Insurance</a:t>
           </a:r>
         </a:p>
@@ -6858,7 +6858,7 @@
       <dgm:spPr/>
     </dgm:pt>
     <dgm:pt modelId="{AC719575-CA84-4D75-A2F6-036239BB9475}" type="pres">
-      <dgm:prSet presAssocID="{685127EF-E7B0-4846-8BE2-F35BE1C07FEF}" presName="parentText" presStyleLbl="node1" presStyleIdx="2" presStyleCnt="5">
+      <dgm:prSet presAssocID="{685127EF-E7B0-4846-8BE2-F35BE1C07FEF}" presName="parentText" presStyleLbl="node1" presStyleIdx="2" presStyleCnt="5" custLinFactNeighborX="-2042">
         <dgm:presLayoutVars>
           <dgm:chMax val="0"/>
           <dgm:bulletEnabled val="1"/>
@@ -6948,7 +6948,7 @@
         <a:p>
           <a:r>
             <a:rPr lang="en-US" dirty="0"/>
-            <a:t>Number of Player</a:t>
+            <a:t>Number of Players</a:t>
           </a:r>
         </a:p>
       </dgm:t>
@@ -6983,7 +6983,7 @@
         <a:lstStyle/>
         <a:p>
           <a:r>
-            <a:rPr lang="en-US"/>
+            <a:rPr lang="en-US" dirty="0"/>
             <a:t>Cards distributed to players</a:t>
           </a:r>
         </a:p>
@@ -7019,8 +7019,8 @@
         <a:lstStyle/>
         <a:p>
           <a:r>
-            <a:rPr lang="en-US"/>
-            <a:t>Player Bet</a:t>
+            <a:rPr lang="en-US" dirty="0"/>
+            <a:t>Players Bet</a:t>
           </a:r>
         </a:p>
       </dgm:t>
@@ -7216,7 +7216,7 @@
         <a:lstStyle/>
         <a:p>
           <a:r>
-            <a:rPr lang="en-US"/>
+            <a:rPr lang="en-US" dirty="0"/>
             <a:t>If Game Should have Head Cards or not</a:t>
           </a:r>
         </a:p>
@@ -7266,7 +7266,7 @@
         <a:lstStyle/>
         <a:p>
           <a:r>
-            <a:rPr lang="en-US"/>
+            <a:rPr lang="en-US" dirty="0"/>
             <a:t>Variable Value of Head Cards</a:t>
           </a:r>
         </a:p>
@@ -7316,7 +7316,7 @@
         <a:lstStyle/>
         <a:p>
           <a:r>
-            <a:rPr lang="en-US"/>
+            <a:rPr lang="en-US" dirty="0"/>
             <a:t>Player cards are disclosed at the end of the game</a:t>
           </a:r>
         </a:p>
@@ -7366,7 +7366,7 @@
         <a:lstStyle/>
         <a:p>
           <a:r>
-            <a:rPr lang="en-US"/>
+            <a:rPr lang="en-US" dirty="0"/>
             <a:t>Blackjack Reward</a:t>
           </a:r>
         </a:p>
@@ -7419,7 +7419,7 @@
         <a:lstStyle/>
         <a:p>
           <a:r>
-            <a:rPr lang="en-US"/>
+            <a:rPr lang="en-US" dirty="0"/>
             <a:t>Explosion Card</a:t>
           </a:r>
         </a:p>
@@ -7687,10 +7687,10 @@
         <a:lstStyle/>
         <a:p>
           <a:r>
-            <a:rPr lang="en-IN" b="1" i="1" u="none"/>
-            <a:t>2 - There will be no change in the chances of winning, if the player or the dealer lose by receiving a Blackjack in the first two dealt cards.</a:t>
+            <a:rPr lang="en-IN" b="1" i="1" u="none" dirty="0"/>
+            <a:t>2 - There will be no change in the dealer’s chances of winning, if the player loses by receiving a Blackjack in the first two dealt cards.</a:t>
           </a:r>
-          <a:endParaRPr lang="en-IN"/>
+          <a:endParaRPr lang="en-IN" dirty="0"/>
         </a:p>
       </dgm:t>
     </dgm:pt>
@@ -7978,11 +7978,11 @@
         <a:lstStyle/>
         <a:p>
           <a:r>
-            <a:rPr lang="en-IN" b="1" u="none"/>
+            <a:rPr lang="en-IN" b="1" u="none" dirty="0"/>
             <a:t>4 -</a:t>
           </a:r>
           <a:r>
-            <a:rPr lang="en-IN" b="1" i="1" u="none"/>
+            <a:rPr lang="en-IN" b="1" i="1" u="none" dirty="0"/>
             <a:t>There will be no change in the player’s chances of winning, When the target is increased or decreased over the default value of 21, keeping the other parameters constant</a:t>
           </a:r>
           <a:endParaRPr lang="en-IN" dirty="0"/>
@@ -8019,7 +8019,7 @@
         <a:lstStyle/>
         <a:p>
           <a:r>
-            <a:rPr lang="en-IN" b="1" i="1" u="none">
+            <a:rPr lang="en-IN" b="1" i="1" u="none" dirty="0">
               <a:latin typeface="Calibri" panose="020F0502020204030204"/>
               <a:ea typeface="+mn-ea"/>
               <a:cs typeface="+mn-cs"/>
@@ -8804,7 +8804,7 @@
             <a:buNone/>
           </a:pPr>
           <a:r>
-            <a:rPr lang="en-US" sz="3100" kern="1200"/>
+            <a:rPr lang="en-US" sz="3100" kern="1200" dirty="0"/>
             <a:t>Player Decision to Stand</a:t>
           </a:r>
         </a:p>
@@ -8882,7 +8882,7 @@
             <a:buNone/>
           </a:pPr>
           <a:r>
-            <a:rPr lang="en-US" sz="3100" kern="1200"/>
+            <a:rPr lang="en-US" sz="3100" kern="1200" dirty="0"/>
             <a:t>Dealer Decision to Stand</a:t>
           </a:r>
         </a:p>
@@ -8960,7 +8960,7 @@
             <a:buNone/>
           </a:pPr>
           <a:r>
-            <a:rPr lang="en-US" sz="3100" kern="1200"/>
+            <a:rPr lang="en-US" sz="3100" kern="1200" dirty="0"/>
             <a:t>No Insurance</a:t>
           </a:r>
         </a:p>
@@ -9207,7 +9207,7 @@
           </a:pPr>
           <a:r>
             <a:rPr lang="en-US" sz="3000" kern="1200" dirty="0"/>
-            <a:t>Number of Player</a:t>
+            <a:t>Number of Players</a:t>
           </a:r>
         </a:p>
       </dsp:txBody>
@@ -9284,7 +9284,7 @@
             <a:buNone/>
           </a:pPr>
           <a:r>
-            <a:rPr lang="en-US" sz="3000" kern="1200"/>
+            <a:rPr lang="en-US" sz="3000" kern="1200" dirty="0"/>
             <a:t>Cards distributed to players</a:t>
           </a:r>
         </a:p>
@@ -9362,8 +9362,8 @@
             <a:buNone/>
           </a:pPr>
           <a:r>
-            <a:rPr lang="en-US" sz="3000" kern="1200"/>
-            <a:t>Player Bet</a:t>
+            <a:rPr lang="en-US" sz="3000" kern="1200" dirty="0"/>
+            <a:t>Players Bet</a:t>
           </a:r>
         </a:p>
       </dsp:txBody>
@@ -9606,7 +9606,7 @@
             <a:buNone/>
           </a:pPr>
           <a:r>
-            <a:rPr lang="en-US" sz="1700" kern="1200"/>
+            <a:rPr lang="en-US" sz="1700" kern="1200" dirty="0"/>
             <a:t>If Game Should have Head Cards or not</a:t>
           </a:r>
         </a:p>
@@ -9722,7 +9722,7 @@
             <a:buNone/>
           </a:pPr>
           <a:r>
-            <a:rPr lang="en-US" sz="1700" kern="1200"/>
+            <a:rPr lang="en-US" sz="1700" kern="1200" dirty="0"/>
             <a:t>Variable Value of Head Cards</a:t>
           </a:r>
         </a:p>
@@ -9838,7 +9838,7 @@
             <a:buNone/>
           </a:pPr>
           <a:r>
-            <a:rPr lang="en-US" sz="1700" kern="1200"/>
+            <a:rPr lang="en-US" sz="1700" kern="1200" dirty="0"/>
             <a:t>Player cards are disclosed at the end of the game</a:t>
           </a:r>
         </a:p>
@@ -9954,7 +9954,7 @@
             <a:buNone/>
           </a:pPr>
           <a:r>
-            <a:rPr lang="en-US" sz="1700" kern="1200"/>
+            <a:rPr lang="en-US" sz="1700" kern="1200" dirty="0"/>
             <a:t>Blackjack Reward</a:t>
           </a:r>
         </a:p>
@@ -10035,7 +10035,7 @@
             <a:buNone/>
           </a:pPr>
           <a:r>
-            <a:rPr lang="en-US" sz="1700" kern="1200"/>
+            <a:rPr lang="en-US" sz="1700" kern="1200" dirty="0"/>
             <a:t>Explosion Card</a:t>
           </a:r>
         </a:p>
@@ -10288,10 +10288,10 @@
             <a:buNone/>
           </a:pPr>
           <a:r>
-            <a:rPr lang="en-IN" sz="2100" b="1" i="1" u="none" kern="1200"/>
-            <a:t>2 - There will be no change in the chances of winning, if the player or the dealer lose by receiving a Blackjack in the first two dealt cards.</a:t>
+            <a:rPr lang="en-IN" sz="2100" b="1" i="1" u="none" kern="1200" dirty="0"/>
+            <a:t>2 - There will be no change in the dealer’s chances of winning, if the player loses by receiving a Blackjack in the first two dealt cards.</a:t>
           </a:r>
-          <a:endParaRPr lang="en-IN" sz="2100" kern="1200"/>
+          <a:endParaRPr lang="en-IN" sz="2100" kern="1200" dirty="0"/>
         </a:p>
       </dsp:txBody>
       <dsp:txXfrm>
@@ -10472,7 +10472,7 @@
             <a:buNone/>
           </a:pPr>
           <a:r>
-            <a:rPr lang="en-IN" sz="2100" b="1" i="1" u="none" kern="1200">
+            <a:rPr lang="en-IN" sz="2100" b="1" i="1" u="none" kern="1200" dirty="0">
               <a:latin typeface="Calibri" panose="020F0502020204030204"/>
               <a:ea typeface="+mn-ea"/>
               <a:cs typeface="+mn-cs"/>
@@ -10636,11 +10636,11 @@
             <a:buNone/>
           </a:pPr>
           <a:r>
-            <a:rPr lang="en-IN" sz="2100" b="1" u="none" kern="1200"/>
+            <a:rPr lang="en-IN" sz="2100" b="1" u="none" kern="1200" dirty="0"/>
             <a:t>4 -</a:t>
           </a:r>
           <a:r>
-            <a:rPr lang="en-IN" sz="2100" b="1" i="1" u="none" kern="1200"/>
+            <a:rPr lang="en-IN" sz="2100" b="1" i="1" u="none" kern="1200" dirty="0"/>
             <a:t>There will be no change in the player’s chances of winning, When the target is increased or decreased over the default value of 21, keeping the other parameters constant</a:t>
           </a:r>
           <a:endParaRPr lang="en-IN" sz="2100" kern="1200" dirty="0"/>
@@ -25847,23 +25847,7 @@
                   <a:schemeClr val="bg1"/>
                 </a:solidFill>
               </a:rPr>
-              <a:t>: int, </a:t>
-            </a:r>
-            <a:r>
-              <a:rPr lang="en-US" dirty="0" err="1">
-                <a:solidFill>
-                  <a:schemeClr val="bg1"/>
-                </a:solidFill>
-              </a:rPr>
-              <a:t>Summary:bool</a:t>
-            </a:r>
-            <a:r>
-              <a:rPr lang="en-US" dirty="0">
-                <a:solidFill>
-                  <a:schemeClr val="bg1"/>
-                </a:solidFill>
-              </a:rPr>
-              <a:t> =True, </a:t>
+              <a:t>: int, Summary: bool =True, </a:t>
             </a:r>
             <a:r>
               <a:rPr lang="en-US" dirty="0" err="1">
@@ -25974,7 +25958,7 @@
             <p:ph idx="1"/>
             <p:extLst>
               <p:ext uri="{D42A27DB-BD31-4B8C-83A1-F6EECF244321}">
-                <p14:modId xmlns:p14="http://schemas.microsoft.com/office/powerpoint/2010/main" val="3215456129"/>
+                <p14:modId xmlns:p14="http://schemas.microsoft.com/office/powerpoint/2010/main" val="1633517761"/>
               </p:ext>
             </p:extLst>
           </p:nvPr>
@@ -26704,18 +26688,9 @@
   <p:clrMapOvr>
     <a:overrideClrMapping bg1="dk1" tx1="lt1" bg2="dk2" tx2="lt2" accent1="accent1" accent2="accent2" accent3="accent3" accent4="accent4" accent5="accent5" accent6="accent6" hlink="hlink" folHlink="folHlink"/>
   </p:clrMapOvr>
-  <mc:AlternateContent xmlns:mc="http://schemas.openxmlformats.org/markup-compatibility/2006" xmlns:p14="http://schemas.microsoft.com/office/powerpoint/2010/main">
-    <mc:Choice Requires="p14">
-      <p:transition spd="slow" p14:dur="1500">
-        <p:split orient="vert"/>
-      </p:transition>
-    </mc:Choice>
-    <mc:Fallback xmlns="">
-      <p:transition spd="slow">
-        <p:split orient="vert"/>
-      </p:transition>
-    </mc:Fallback>
-  </mc:AlternateContent>
+  <p:transition>
+    <p:split orient="vert"/>
+  </p:transition>
 </p:sld>
 </file>
 
@@ -27334,18 +27309,9 @@
   <p:clrMapOvr>
     <a:overrideClrMapping bg1="dk1" tx1="lt1" bg2="dk2" tx2="lt2" accent1="accent1" accent2="accent2" accent3="accent3" accent4="accent4" accent5="accent5" accent6="accent6" hlink="hlink" folHlink="folHlink"/>
   </p:clrMapOvr>
-  <mc:AlternateContent xmlns:mc="http://schemas.openxmlformats.org/markup-compatibility/2006" xmlns:p14="http://schemas.microsoft.com/office/powerpoint/2010/main">
-    <mc:Choice Requires="p14">
-      <p:transition spd="slow" p14:dur="1500">
-        <p:split orient="vert"/>
-      </p:transition>
-    </mc:Choice>
-    <mc:Fallback xmlns="">
-      <p:transition spd="slow">
-        <p:split orient="vert"/>
-      </p:transition>
-    </mc:Fallback>
-  </mc:AlternateContent>
+  <p:transition>
+    <p:split orient="vert"/>
+  </p:transition>
 </p:sld>
 </file>
 
@@ -27633,18 +27599,9 @@
   <p:clrMapOvr>
     <a:overrideClrMapping bg1="dk1" tx1="lt1" bg2="dk2" tx2="lt2" accent1="accent1" accent2="accent2" accent3="accent3" accent4="accent4" accent5="accent5" accent6="accent6" hlink="hlink" folHlink="folHlink"/>
   </p:clrMapOvr>
-  <mc:AlternateContent xmlns:mc="http://schemas.openxmlformats.org/markup-compatibility/2006" xmlns:p14="http://schemas.microsoft.com/office/powerpoint/2010/main">
-    <mc:Choice Requires="p14">
-      <p:transition spd="slow" p14:dur="1500">
-        <p:split orient="vert"/>
-      </p:transition>
-    </mc:Choice>
-    <mc:Fallback xmlns="">
-      <p:transition spd="slow">
-        <p:split orient="vert"/>
-      </p:transition>
-    </mc:Fallback>
-  </mc:AlternateContent>
+  <p:transition>
+    <p:split orient="vert"/>
+  </p:transition>
 </p:sld>
 </file>
 
@@ -27653,10 +27610,9 @@
   <p:cSld>
     <p:bg>
       <p:bgPr>
-        <a:blipFill>
-          <a:blip r:embed="rId2"/>
-          <a:tile tx="0" ty="0" sx="100000" sy="100000" flip="none" algn="tl"/>
-        </a:blipFill>
+        <a:solidFill>
+          <a:schemeClr val="bg1"/>
+        </a:solidFill>
         <a:effectLst/>
       </p:bgPr>
     </p:bg>
@@ -27676,7 +27632,7 @@
       </p:grpSpPr>
       <p:sp>
         <p:nvSpPr>
-          <p:cNvPr id="66" name="Rectangle 36">
+          <p:cNvPr id="73" name="Rectangle 72">
             <a:extLst>
               <a:ext uri="{FF2B5EF4-FFF2-40B4-BE49-F238E27FC236}">
                 <a16:creationId xmlns:a16="http://schemas.microsoft.com/office/drawing/2014/main" id="{233F6408-E1FB-40EE-933F-488D38CCC73F}"/>
@@ -27739,7 +27695,7 @@
       </p:sp>
       <p:sp useBgFill="1">
         <p:nvSpPr>
-          <p:cNvPr id="67" name="Freeform 23">
+          <p:cNvPr id="75" name="Freeform 23">
             <a:extLst>
               <a:ext uri="{FF2B5EF4-FFF2-40B4-BE49-F238E27FC236}">
                 <a16:creationId xmlns:a16="http://schemas.microsoft.com/office/drawing/2014/main" id="{F055C0C5-567C-4C02-83F3-B427BC740697}"/>
@@ -27948,13 +27904,13 @@
         </p:nvSpPr>
         <p:spPr>
           <a:xfrm>
-            <a:off x="396570" y="1258529"/>
-            <a:ext cx="3843864" cy="4443578"/>
+            <a:off x="838201" y="1825625"/>
+            <a:ext cx="3200400" cy="4351338"/>
           </a:xfrm>
         </p:spPr>
         <p:txBody>
           <a:bodyPr>
-            <a:normAutofit fontScale="77500" lnSpcReduction="20000"/>
+            <a:normAutofit/>
           </a:bodyPr>
           <a:lstStyle/>
           <a:p>
@@ -27962,7 +27918,7 @@
               <a:buNone/>
             </a:pPr>
             <a:r>
-              <a:rPr lang="en-US" sz="4700" b="1">
+              <a:rPr lang="en-US" sz="1700" b="1" dirty="0">
                 <a:latin typeface="Algerian" panose="04020705040A02060702" pitchFamily="82" charset="0"/>
                 <a:cs typeface="Aharoni" panose="02010803020104030203" pitchFamily="2" charset="-79"/>
               </a:rPr>
@@ -27970,82 +27926,65 @@
             </a:r>
           </a:p>
           <a:p>
-            <a:endParaRPr lang="en-US" sz="1100"/>
+            <a:endParaRPr lang="en-US" sz="1700" dirty="0"/>
           </a:p>
           <a:p>
             <a:r>
-              <a:rPr lang="en-US" sz="2200" b="1"/>
+              <a:rPr lang="en-US" sz="1700" b="1" dirty="0"/>
               <a:t>Number of simulations: 100000</a:t>
             </a:r>
           </a:p>
           <a:p>
             <a:r>
-              <a:rPr lang="en-US" sz="2200" b="1"/>
+              <a:rPr lang="en-US" sz="1700" b="1" dirty="0"/>
               <a:t>Target Score: 32</a:t>
             </a:r>
           </a:p>
           <a:p>
             <a:r>
-              <a:rPr lang="en-US" sz="2200" b="1"/>
-              <a:t>Head Card: 1</a:t>
+              <a:rPr lang="en-US" sz="1700" b="1" dirty="0"/>
+              <a:t>Head Card: True</a:t>
             </a:r>
           </a:p>
           <a:p>
             <a:r>
-              <a:rPr lang="en-US" sz="2200" b="1"/>
+              <a:rPr lang="en-US" sz="1700" b="1" dirty="0"/>
               <a:t>Head Card Value: 12</a:t>
             </a:r>
           </a:p>
           <a:p>
             <a:r>
-              <a:rPr lang="en-US" sz="2200" b="1"/>
-              <a:t>Should the Dealer be given the advantage: 1</a:t>
+              <a:rPr lang="en-US" sz="1700" b="1" dirty="0"/>
+              <a:t>Should the Dealer be given the advantage: True</a:t>
             </a:r>
           </a:p>
           <a:p>
             <a:r>
-              <a:rPr lang="en-US" sz="2200" b="1"/>
+              <a:rPr lang="en-US" sz="1700" b="1" dirty="0"/>
               <a:t>Perfect Blackjack Reward: 200</a:t>
             </a:r>
           </a:p>
           <a:p>
             <a:r>
-              <a:rPr lang="en-US" sz="2200" b="1"/>
-              <a:t>explosion Kit: 1</a:t>
+              <a:rPr lang="en-US" sz="1700" b="1" dirty="0"/>
+              <a:t>Explosion card: True</a:t>
             </a:r>
+            <a:endParaRPr lang="en-US" sz="1700" dirty="0"/>
           </a:p>
           <a:p>
-            <a:r>
-              <a:rPr lang="en-US" sz="2200" b="1"/>
-              <a:t>Print Summary: 1</a:t>
-            </a:r>
+            <a:pPr marL="0" indent="0">
+              <a:buNone/>
+            </a:pPr>
+            <a:endParaRPr lang="en-US" sz="1700" dirty="0"/>
           </a:p>
           <a:p>
-            <a:r>
-              <a:rPr lang="en-US" sz="2200" b="1"/>
-              <a:t>Detailed Summary: 0</a:t>
-            </a:r>
-          </a:p>
-          <a:p>
-            <a:endParaRPr lang="en-US" sz="1100"/>
-          </a:p>
-          <a:p>
-            <a:endParaRPr lang="en-US" sz="1100"/>
-          </a:p>
-          <a:p>
-            <a:r>
-              <a:rPr lang="en-US" sz="1100"/>
-              <a:t> </a:t>
-            </a:r>
-          </a:p>
-          <a:p>
-            <a:endParaRPr lang="en-IN" sz="1100" dirty="0"/>
+            <a:endParaRPr lang="en-IN" sz="1700" dirty="0"/>
           </a:p>
         </p:txBody>
       </p:sp>
       <p:sp>
         <p:nvSpPr>
-          <p:cNvPr id="68" name="Rounded Rectangle 17">
+          <p:cNvPr id="77" name="Rounded Rectangle 17">
             <a:extLst>
               <a:ext uri="{FF2B5EF4-FFF2-40B4-BE49-F238E27FC236}">
                 <a16:creationId xmlns:a16="http://schemas.microsoft.com/office/drawing/2014/main" id="{E48B6BD6-5DED-4B86-A4B3-D35037F68FC4}"/>
@@ -28113,7 +28052,7 @@
       </p:sp>
       <p:pic>
         <p:nvPicPr>
-          <p:cNvPr id="14" name="Picture 13">
+          <p:cNvPr id="14" name="Picture 13" descr="Chart, line chart&#10;&#10;Description automatically generated">
             <a:extLst>
               <a:ext uri="{FF2B5EF4-FFF2-40B4-BE49-F238E27FC236}">
                 <a16:creationId xmlns:a16="http://schemas.microsoft.com/office/drawing/2014/main" id="{FBF1193C-3F4C-4109-931F-5B17586C5606}"/>
@@ -28124,7 +28063,7 @@
           <p:nvPr/>
         </p:nvPicPr>
         <p:blipFill rotWithShape="1">
-          <a:blip r:embed="rId3"/>
+          <a:blip r:embed="rId2"/>
           <a:srcRect l="7701" r="5376"/>
           <a:stretch/>
         </p:blipFill>
@@ -28148,18 +28087,9 @@
   <p:clrMapOvr>
     <a:masterClrMapping/>
   </p:clrMapOvr>
-  <mc:AlternateContent xmlns:mc="http://schemas.openxmlformats.org/markup-compatibility/2006" xmlns:p14="http://schemas.microsoft.com/office/powerpoint/2010/main">
-    <mc:Choice Requires="p14">
-      <p:transition spd="slow" p14:dur="1500">
-        <p:split orient="vert"/>
-      </p:transition>
-    </mc:Choice>
-    <mc:Fallback xmlns="">
-      <p:transition spd="slow">
-        <p:split orient="vert"/>
-      </p:transition>
-    </mc:Fallback>
-  </mc:AlternateContent>
+  <p:transition>
+    <p:split orient="vert"/>
+  </p:transition>
 </p:sld>
 </file>
 
@@ -28202,7 +28132,7 @@
           <a:lstStyle/>
           <a:p>
             <a:r>
-              <a:rPr lang="en-US"/>
+              <a:rPr lang="en-US" dirty="0"/>
               <a:t>Reference</a:t>
             </a:r>
           </a:p>
@@ -28230,35 +28160,35 @@
           <a:lstStyle/>
           <a:p>
             <a:r>
-              <a:rPr lang="en-US" b="1"/>
+              <a:rPr lang="en-US" b="1" dirty="0"/>
               <a:t>Images</a:t>
             </a:r>
           </a:p>
           <a:p>
             <a:r>
-              <a:rPr lang="en-US">
+              <a:rPr lang="en-US" dirty="0">
                 <a:solidFill>
                   <a:srgbClr val="0563C1"/>
                 </a:solidFill>
               </a:rPr>
               <a:t>http://datagenetics.com/blog/march62020/index.html</a:t>
             </a:r>
-            <a:endParaRPr lang="en-US"/>
+            <a:endParaRPr lang="en-US" dirty="0"/>
           </a:p>
           <a:p>
             <a:r>
-              <a:rPr lang="en-US">
+              <a:rPr lang="en-US" dirty="0">
                 <a:hlinkClick r:id="rId2"/>
               </a:rPr>
               <a:t>https://www.888casino.com/blog/blackjack-strategy-guide/how-to-play-blackjack</a:t>
             </a:r>
             <a:r>
-              <a:rPr lang="en-US"/>
+              <a:rPr lang="en-US" dirty="0"/>
               <a:t> </a:t>
             </a:r>
           </a:p>
           <a:p>
-            <a:endParaRPr lang="en-US">
+            <a:endParaRPr lang="en-US" dirty="0">
               <a:solidFill>
                 <a:srgbClr val="0563C1"/>
               </a:solidFill>
@@ -28273,10 +28203,10 @@
           </a:p>
           <a:p>
             <a:r>
-              <a:rPr lang="en-US" b="1"/>
+              <a:rPr lang="en-US" b="1" dirty="0"/>
               <a:t>Content</a:t>
             </a:r>
-            <a:endParaRPr lang="en-US" b="1">
+            <a:endParaRPr lang="en-US" b="1" dirty="0">
               <a:hlinkClick r:id="rId3">
                 <a:extLst>
                   <a:ext uri="{A12FA001-AC4F-418D-AE19-62706E023703}">
@@ -28288,7 +28218,7 @@
           </a:p>
           <a:p>
             <a:r>
-              <a:rPr lang="en-US">
+              <a:rPr lang="en-US" dirty="0">
                 <a:solidFill>
                   <a:srgbClr val="0563C1"/>
                 </a:solidFill>
@@ -28302,22 +28232,22 @@
               </a:rPr>
               <a:t>https://www.youtube.com/watch?v=5bWpnABkU-Y&amp;ab_channel=CrazyVegasOnlineCasino</a:t>
             </a:r>
-            <a:endParaRPr lang="en-US"/>
+            <a:endParaRPr lang="en-US" dirty="0"/>
           </a:p>
           <a:p>
             <a:r>
-              <a:rPr lang="en-US">
+              <a:rPr lang="en-US" dirty="0">
                 <a:hlinkClick r:id="rId4"/>
               </a:rPr>
               <a:t>https://www.247blackjack.com/</a:t>
             </a:r>
-            <a:endParaRPr lang="en-US"/>
+            <a:endParaRPr lang="en-US" dirty="0"/>
           </a:p>
           <a:p>
-            <a:endParaRPr lang="en-US"/>
+            <a:endParaRPr lang="en-US" dirty="0"/>
           </a:p>
           <a:p>
-            <a:endParaRPr lang="en-US"/>
+            <a:endParaRPr lang="en-US" dirty="0"/>
           </a:p>
         </p:txBody>
       </p:sp>
@@ -28407,8 +28337,8 @@
         </p:nvSpPr>
         <p:spPr>
           <a:xfrm>
-            <a:off x="838200" y="2318785"/>
-            <a:ext cx="10515600" cy="2715553"/>
+            <a:off x="838200" y="2382397"/>
+            <a:ext cx="10515600" cy="2213458"/>
           </a:xfrm>
           <a:ln>
             <a:noFill/>
@@ -28462,7 +28392,7 @@
             </a:pPr>
             <a:r>
               <a:rPr lang="en-US" b="1" i="1" dirty="0"/>
-              <a:t>To compare the various variations of the Game Blackjack with the original blackjack to identify if the other variations succeed as a game and if they are worth playing in a Club along with Blackjack.</a:t>
+              <a:t>To compare the various variations of the Game Blackjack with the original blackjack to identify if the variations are worth playing in a Club along with Blackjack.</a:t>
             </a:r>
           </a:p>
         </p:txBody>
@@ -29376,7 +29306,7 @@
           <p:nvPr>
             <p:extLst>
               <p:ext uri="{D42A27DB-BD31-4B8C-83A1-F6EECF244321}">
-                <p14:modId xmlns:p14="http://schemas.microsoft.com/office/powerpoint/2010/main" val="2818527581"/>
+                <p14:modId xmlns:p14="http://schemas.microsoft.com/office/powerpoint/2010/main" val="1409445809"/>
               </p:ext>
             </p:extLst>
           </p:nvPr>
@@ -29472,7 +29402,7 @@
           <p:nvPr>
             <p:extLst>
               <p:ext uri="{D42A27DB-BD31-4B8C-83A1-F6EECF244321}">
-                <p14:modId xmlns:p14="http://schemas.microsoft.com/office/powerpoint/2010/main" val="3296538941"/>
+                <p14:modId xmlns:p14="http://schemas.microsoft.com/office/powerpoint/2010/main" val="2379919930"/>
               </p:ext>
             </p:extLst>
           </p:nvPr>

</xml_diff>